<commit_message>
ANU logo cropping on Stakeholders image
</commit_message>
<xml_diff>
--- a/Stakeholder.pptx
+++ b/Stakeholder.pptx
@@ -208,7 +208,7 @@
           <a:p>
             <a:fld id="{E4C1DFA3-529D-45E4-8944-D62720A6434D}" type="datetimeFigureOut">
               <a:rPr lang="en-AU" smtClean="0"/>
-              <a:t>4/03/2018</a:t>
+              <a:t>8/03/2018</a:t>
             </a:fld>
             <a:endParaRPr lang="en-AU"/>
           </a:p>
@@ -691,7 +691,7 @@
           <a:p>
             <a:fld id="{F56E48C8-666B-4AC2-9EE6-9CECAD717E72}" type="datetimeFigureOut">
               <a:rPr lang="en-AU" smtClean="0"/>
-              <a:t>4/03/2018</a:t>
+              <a:t>8/03/2018</a:t>
             </a:fld>
             <a:endParaRPr lang="en-AU"/>
           </a:p>
@@ -861,7 +861,7 @@
           <a:p>
             <a:fld id="{F56E48C8-666B-4AC2-9EE6-9CECAD717E72}" type="datetimeFigureOut">
               <a:rPr lang="en-AU" smtClean="0"/>
-              <a:t>4/03/2018</a:t>
+              <a:t>8/03/2018</a:t>
             </a:fld>
             <a:endParaRPr lang="en-AU"/>
           </a:p>
@@ -1041,7 +1041,7 @@
           <a:p>
             <a:fld id="{F56E48C8-666B-4AC2-9EE6-9CECAD717E72}" type="datetimeFigureOut">
               <a:rPr lang="en-AU" smtClean="0"/>
-              <a:t>4/03/2018</a:t>
+              <a:t>8/03/2018</a:t>
             </a:fld>
             <a:endParaRPr lang="en-AU"/>
           </a:p>
@@ -1929,7 +1929,7 @@
           <a:p>
             <a:fld id="{F56E48C8-666B-4AC2-9EE6-9CECAD717E72}" type="datetimeFigureOut">
               <a:rPr lang="en-AU" smtClean="0"/>
-              <a:t>4/03/2018</a:t>
+              <a:t>8/03/2018</a:t>
             </a:fld>
             <a:endParaRPr lang="en-AU"/>
           </a:p>
@@ -2173,7 +2173,7 @@
           <a:p>
             <a:fld id="{F56E48C8-666B-4AC2-9EE6-9CECAD717E72}" type="datetimeFigureOut">
               <a:rPr lang="en-AU" smtClean="0"/>
-              <a:t>4/03/2018</a:t>
+              <a:t>8/03/2018</a:t>
             </a:fld>
             <a:endParaRPr lang="en-AU"/>
           </a:p>
@@ -2405,7 +2405,7 @@
           <a:p>
             <a:fld id="{F56E48C8-666B-4AC2-9EE6-9CECAD717E72}" type="datetimeFigureOut">
               <a:rPr lang="en-AU" smtClean="0"/>
-              <a:t>4/03/2018</a:t>
+              <a:t>8/03/2018</a:t>
             </a:fld>
             <a:endParaRPr lang="en-AU"/>
           </a:p>
@@ -2772,7 +2772,7 @@
           <a:p>
             <a:fld id="{F56E48C8-666B-4AC2-9EE6-9CECAD717E72}" type="datetimeFigureOut">
               <a:rPr lang="en-AU" smtClean="0"/>
-              <a:t>4/03/2018</a:t>
+              <a:t>8/03/2018</a:t>
             </a:fld>
             <a:endParaRPr lang="en-AU"/>
           </a:p>
@@ -2890,7 +2890,7 @@
           <a:p>
             <a:fld id="{F56E48C8-666B-4AC2-9EE6-9CECAD717E72}" type="datetimeFigureOut">
               <a:rPr lang="en-AU" smtClean="0"/>
-              <a:t>4/03/2018</a:t>
+              <a:t>8/03/2018</a:t>
             </a:fld>
             <a:endParaRPr lang="en-AU"/>
           </a:p>
@@ -2985,7 +2985,7 @@
           <a:p>
             <a:fld id="{F56E48C8-666B-4AC2-9EE6-9CECAD717E72}" type="datetimeFigureOut">
               <a:rPr lang="en-AU" smtClean="0"/>
-              <a:t>4/03/2018</a:t>
+              <a:t>8/03/2018</a:t>
             </a:fld>
             <a:endParaRPr lang="en-AU"/>
           </a:p>
@@ -3262,7 +3262,7 @@
           <a:p>
             <a:fld id="{F56E48C8-666B-4AC2-9EE6-9CECAD717E72}" type="datetimeFigureOut">
               <a:rPr lang="en-AU" smtClean="0"/>
-              <a:t>4/03/2018</a:t>
+              <a:t>8/03/2018</a:t>
             </a:fld>
             <a:endParaRPr lang="en-AU"/>
           </a:p>
@@ -3519,7 +3519,7 @@
           <a:p>
             <a:fld id="{F56E48C8-666B-4AC2-9EE6-9CECAD717E72}" type="datetimeFigureOut">
               <a:rPr lang="en-AU" smtClean="0"/>
-              <a:t>4/03/2018</a:t>
+              <a:t>8/03/2018</a:t>
             </a:fld>
             <a:endParaRPr lang="en-AU"/>
           </a:p>
@@ -3732,7 +3732,7 @@
           <a:p>
             <a:fld id="{F56E48C8-666B-4AC2-9EE6-9CECAD717E72}" type="datetimeFigureOut">
               <a:rPr lang="en-AU" smtClean="0"/>
-              <a:t>4/03/2018</a:t>
+              <a:t>8/03/2018</a:t>
             </a:fld>
             <a:endParaRPr lang="en-AU"/>
           </a:p>
@@ -4372,7 +4372,7 @@
             <p:ph type="pic" sz="quarter" idx="27"/>
           </p:nvPr>
         </p:nvPicPr>
-        <p:blipFill>
+        <p:blipFill rotWithShape="1">
           <a:blip r:embed="rId3">
             <a:extLst>
               <a:ext uri="{28A0092B-C50C-407E-A947-70E740481C1C}">
@@ -4380,12 +4380,15 @@
               </a:ext>
             </a:extLst>
           </a:blip>
-          <a:srcRect t="2874" b="2874"/>
-          <a:stretch>
-            <a:fillRect/>
-          </a:stretch>
+          <a:srcRect l="-2448" t="-9335" r="-3455" b="-5457"/>
+          <a:stretch/>
         </p:blipFill>
-        <p:spPr/>
+        <p:spPr>
+          <a:xfrm>
+            <a:off x="646096" y="1476152"/>
+            <a:ext cx="4067289" cy="1507998"/>
+          </a:xfrm>
+        </p:spPr>
       </p:pic>
       <p:pic>
         <p:nvPicPr>

</xml_diff>